<commit_message>
Updated to reflect schedule change
We pushed everything out one week at week 5
</commit_message>
<xml_diff>
--- a/Notes and Slides/Wk5Day1-UI Layouts.pptx
+++ b/Notes and Slides/Wk5Day1-UI Layouts.pptx
@@ -152,7 +152,7 @@
       </p14:sectionLst>
     </p:ext>
     <p:ext uri="{EFAFB233-063F-42B5-8137-9DF3F51BA10A}">
-      <p15:sldGuideLst xmlns:p15="http://schemas.microsoft.com/office/powerpoint/2012/main">
+      <p15:sldGuideLst xmlns="" xmlns:p15="http://schemas.microsoft.com/office/powerpoint/2012/main">
         <p15:guide id="1" orient="horz" pos="2160">
           <p15:clr>
             <a:srgbClr val="A4A3A4"/>
@@ -4087,7 +4087,7 @@
   <p:timing>
     <p:tnLst>
       <p:par>
-        <p:cTn id="1" dur="indefinite" restart="never" nodeType="tmRoot"/>
+        <p:cTn xmlns:p14="http://schemas.microsoft.com/office/powerpoint/2010/main" id="1" dur="indefinite" restart="never" nodeType="tmRoot"/>
       </p:par>
     </p:tnLst>
   </p:timing>
@@ -5182,14 +5182,14 @@
             <p:ph sz="half" idx="1"/>
             <p:extLst>
               <p:ext uri="{D42A27DB-BD31-4B8C-83A1-F6EECF244321}">
-                <p14:modId xmlns:p14="http://schemas.microsoft.com/office/powerpoint/2010/main" val="3962588837"/>
+                <p14:modId xmlns:p14="http://schemas.microsoft.com/office/powerpoint/2010/main" val="3093013348"/>
               </p:ext>
             </p:extLst>
           </p:nvPr>
         </p:nvGraphicFramePr>
         <p:xfrm>
           <a:off x="356277" y="2033752"/>
-          <a:ext cx="3991801" cy="4298238"/>
+          <a:ext cx="3991801" cy="4298237"/>
         </p:xfrm>
         <a:graphic>
           <a:graphicData uri="http://schemas.openxmlformats.org/drawingml/2006/table">
@@ -5415,7 +5415,7 @@
                     <a:noFill/>
                   </a:tcPr>
                 </a:tc>
-                <a:tc>
+                <a:tc rowSpan="2">
                   <a:txBody>
                     <a:bodyPr/>
                     <a:lstStyle/>
@@ -5474,7 +5474,7 @@
                     </a:solidFill>
                   </a:tcPr>
                 </a:tc>
-                <a:tc>
+                <a:tc vMerge="1">
                   <a:txBody>
                     <a:bodyPr/>
                     <a:lstStyle/>
@@ -5496,14 +5496,6 @@
                         <a:tabLst/>
                         <a:defRPr/>
                       </a:pPr>
-                      <a:r>
-                        <a:rPr lang="en-US" sz="2800" dirty="0" smtClean="0"/>
-                        <a:t>Layouts + </a:t>
-                      </a:r>
-                      <a:r>
-                        <a:rPr lang="en-US" sz="2800" baseline="0" dirty="0" smtClean="0"/>
-                        <a:t>orientation</a:t>
-                      </a:r>
                       <a:endParaRPr lang="en-US" sz="2800" dirty="0" smtClean="0"/>
                     </a:p>
                   </a:txBody>
@@ -5530,14 +5522,14 @@
             <p:ph sz="half" idx="2"/>
             <p:extLst>
               <p:ext uri="{D42A27DB-BD31-4B8C-83A1-F6EECF244321}">
-                <p14:modId xmlns:p14="http://schemas.microsoft.com/office/powerpoint/2010/main" val="2548745757"/>
+                <p14:modId xmlns:p14="http://schemas.microsoft.com/office/powerpoint/2010/main" val="3962554551"/>
               </p:ext>
             </p:extLst>
           </p:nvPr>
         </p:nvGraphicFramePr>
         <p:xfrm>
           <a:off x="4507872" y="2033752"/>
-          <a:ext cx="4297617" cy="4289142"/>
+          <a:ext cx="4297617" cy="4291762"/>
         </p:xfrm>
         <a:graphic>
           <a:graphicData uri="http://schemas.openxmlformats.org/drawingml/2006/table">
@@ -5579,7 +5571,7 @@
                   <a:tcPr/>
                 </a:tc>
               </a:tr>
-              <a:tr h="957676">
+              <a:tr h="783339">
                 <a:tc>
                   <a:txBody>
                     <a:bodyPr/>
@@ -5618,14 +5610,19 @@
                       </a:pPr>
                       <a:r>
                         <a:rPr lang="en-US" sz="2800" dirty="0" smtClean="0"/>
-                        <a:t>Adapting to size and orientation: fragments</a:t>
+                        <a:t>Layouts + </a:t>
                       </a:r>
+                      <a:r>
+                        <a:rPr lang="en-US" sz="2800" baseline="0" dirty="0" smtClean="0"/>
+                        <a:t>orientation</a:t>
+                      </a:r>
+                      <a:endParaRPr lang="en-US" sz="2800" dirty="0" smtClean="0"/>
                     </a:p>
                   </a:txBody>
                   <a:tcPr/>
                 </a:tc>
               </a:tr>
-              <a:tr h="525177">
+              <a:tr h="948426">
                 <a:tc>
                   <a:txBody>
                     <a:bodyPr/>
@@ -5664,14 +5661,14 @@
                       </a:pPr>
                       <a:r>
                         <a:rPr lang="en-US" sz="2800" dirty="0" smtClean="0"/>
-                        <a:t>Managing data: SQLite</a:t>
+                        <a:t>Adapting to size and orientation: fragments</a:t>
                       </a:r>
                     </a:p>
                   </a:txBody>
                   <a:tcPr/>
                 </a:tc>
               </a:tr>
-              <a:tr h="957676">
+              <a:tr h="578700">
                 <a:tc>
                   <a:txBody>
                     <a:bodyPr/>
@@ -5710,7 +5707,7 @@
                       </a:pPr>
                       <a:r>
                         <a:rPr lang="en-US" sz="2800" dirty="0" smtClean="0"/>
-                        <a:t>Consuming web services</a:t>
+                        <a:t>Managing data: SQLite</a:t>
                       </a:r>
                     </a:p>
                   </a:txBody>
@@ -5756,14 +5753,14 @@
                       </a:pPr>
                       <a:r>
                         <a:rPr lang="en-US" sz="2800" dirty="0" smtClean="0"/>
-                        <a:t>Geolocation</a:t>
+                        <a:t>Consuming web services</a:t>
                       </a:r>
                     </a:p>
                   </a:txBody>
                   <a:tcPr/>
                 </a:tc>
               </a:tr>
-              <a:tr h="957676">
+              <a:tr h="670658">
                 <a:tc>
                   <a:txBody>
                     <a:bodyPr/>
@@ -5801,16 +5798,8 @@
                         <a:defRPr/>
                       </a:pPr>
                       <a:r>
-                        <a:rPr lang="en-US" sz="2800" dirty="0" smtClean="0"/>
-                        <a:t>Publishing</a:t>
-                      </a:r>
-                      <a:r>
-                        <a:rPr lang="en-US" sz="2800" baseline="0" dirty="0" smtClean="0"/>
-                        <a:t> to </a:t>
-                      </a:r>
-                      <a:r>
-                        <a:rPr lang="en-US" sz="2800" dirty="0" smtClean="0"/>
-                        <a:t>the Google Play Store</a:t>
+                        <a:rPr lang="en-US" sz="2800" dirty="0" err="1" smtClean="0"/>
+                        <a:t>Geolocation</a:t>
                       </a:r>
                       <a:endParaRPr lang="en-US" sz="2800" dirty="0" smtClean="0"/>
                     </a:p>
@@ -5835,7 +5824,7 @@
   <p:timing>
     <p:tnLst>
       <p:par>
-        <p:cTn id="1" dur="indefinite" restart="never" nodeType="tmRoot"/>
+        <p:cTn xmlns:p14="http://schemas.microsoft.com/office/powerpoint/2010/main" id="1" dur="indefinite" restart="never" nodeType="tmRoot"/>
       </p:par>
     </p:tnLst>
   </p:timing>

</xml_diff>